<commit_message>
adds some ppts to w4
</commit_message>
<xml_diff>
--- a/pdfs/w4/D13_.NET_HTTPRequestLifeCycle.pptx
+++ b/pdfs/w4/D13_.NET_HTTPRequestLifeCycle.pptx
@@ -387,7 +387,7 @@
           <a:p>
             <a:fld id="{9184DA70-C731-4C70-880D-CCD4705E623C}" type="datetime1">
               <a:rPr lang="en-US" smtClean="0"/>
-              <a:t>12/19/2021</a:t>
+              <a:t>12/29/2021</a:t>
             </a:fld>
             <a:endParaRPr lang="en-US" dirty="0"/>
           </a:p>
@@ -575,7 +575,7 @@
           <a:p>
             <a:fld id="{B612A279-0833-481D-8C56-F67FD0AC6C50}" type="datetime1">
               <a:rPr lang="en-US" smtClean="0"/>
-              <a:t>12/19/2021</a:t>
+              <a:t>12/29/2021</a:t>
             </a:fld>
             <a:endParaRPr lang="en-US" dirty="0"/>
           </a:p>
@@ -817,7 +817,7 @@
           <a:p>
             <a:fld id="{6587DA83-5663-4C9C-B9AA-0B40A3DAFF81}" type="datetime1">
               <a:rPr lang="en-US" smtClean="0"/>
-              <a:t>12/19/2021</a:t>
+              <a:t>12/29/2021</a:t>
             </a:fld>
             <a:endParaRPr lang="en-US" dirty="0"/>
           </a:p>
@@ -1005,7 +1005,7 @@
           <a:p>
             <a:fld id="{4BE1D723-8F53-4F53-90B0-1982A396982E}" type="datetime1">
               <a:rPr lang="en-US" smtClean="0"/>
-              <a:t>12/19/2021</a:t>
+              <a:t>12/29/2021</a:t>
             </a:fld>
             <a:endParaRPr lang="en-US" dirty="0"/>
           </a:p>
@@ -1378,7 +1378,7 @@
           <a:p>
             <a:fld id="{97669AF7-7BEB-44E4-9852-375E34362B5B}" type="datetime1">
               <a:rPr lang="en-US" smtClean="0"/>
-              <a:t>12/19/2021</a:t>
+              <a:t>12/29/2021</a:t>
             </a:fld>
             <a:endParaRPr lang="en-US" dirty="0"/>
           </a:p>
@@ -1633,7 +1633,7 @@
           <a:p>
             <a:fld id="{BAAAC38D-0552-4C82-B593-E6124DFADBE2}" type="datetime1">
               <a:rPr lang="en-US" smtClean="0"/>
-              <a:t>12/19/2021</a:t>
+              <a:t>12/29/2021</a:t>
             </a:fld>
             <a:endParaRPr lang="en-US" dirty="0"/>
           </a:p>
@@ -2030,7 +2030,7 @@
           <a:p>
             <a:fld id="{D9DF0F1C-5577-4ACB-BB62-DF8F3C494C7E}" type="datetime1">
               <a:rPr lang="en-US" smtClean="0"/>
-              <a:t>12/19/2021</a:t>
+              <a:t>12/29/2021</a:t>
             </a:fld>
             <a:endParaRPr lang="en-US" dirty="0"/>
           </a:p>
@@ -2166,7 +2166,7 @@
           <a:p>
             <a:fld id="{1775B394-D9F9-4F0C-B15D-605F45CB9E9F}" type="datetime1">
               <a:rPr lang="en-US" smtClean="0"/>
-              <a:t>12/19/2021</a:t>
+              <a:t>12/29/2021</a:t>
             </a:fld>
             <a:endParaRPr lang="en-US" dirty="0"/>
           </a:p>
@@ -2323,7 +2323,7 @@
           <a:p>
             <a:fld id="{39667345-2558-425A-8533-9BFDBCE15005}" type="datetime1">
               <a:rPr lang="en-US" smtClean="0"/>
-              <a:t>12/19/2021</a:t>
+              <a:t>12/29/2021</a:t>
             </a:fld>
             <a:endParaRPr lang="en-US" dirty="0"/>
           </a:p>
@@ -2652,7 +2652,7 @@
           <a:p>
             <a:fld id="{92BEA474-078D-4E9B-9B14-09A87B19DC46}" type="datetime1">
               <a:rPr lang="en-US" smtClean="0"/>
-              <a:t>12/19/2021</a:t>
+              <a:t>12/29/2021</a:t>
             </a:fld>
             <a:endParaRPr lang="en-US" dirty="0"/>
           </a:p>
@@ -3002,7 +3002,7 @@
           <a:p>
             <a:fld id="{4907D986-8816-4272-A432-0437A28A9828}" type="datetime1">
               <a:rPr lang="en-US" smtClean="0"/>
-              <a:t>12/19/2021</a:t>
+              <a:t>12/29/2021</a:t>
             </a:fld>
             <a:endParaRPr lang="en-US" dirty="0"/>
           </a:p>
@@ -3263,7 +3263,7 @@
           <a:p>
             <a:fld id="{62D6E202-B606-4609-B914-27C9371A1F6D}" type="datetime1">
               <a:rPr lang="en-US" smtClean="0"/>
-              <a:t>12/19/2021</a:t>
+              <a:t>12/29/2021</a:t>
             </a:fld>
             <a:endParaRPr lang="en-US" dirty="0"/>
           </a:p>
@@ -4822,7 +4822,7 @@
           <a:noFill/>
           <a:ln w="25400">
             <a:solidFill>
-              <a:srgbClr val="7030A0"/>
+              <a:srgbClr val="FF00FF"/>
             </a:solidFill>
           </a:ln>
         </p:spPr>
@@ -4847,7 +4847,11 @@
           <a:lstStyle/>
           <a:p>
             <a:pPr algn="ctr"/>
-            <a:endParaRPr lang="en-US"/>
+            <a:endParaRPr lang="en-US">
+              <a:solidFill>
+                <a:srgbClr val="FF00FF"/>
+              </a:solidFill>
+            </a:endParaRPr>
           </a:p>
         </p:txBody>
       </p:sp>
@@ -7764,14 +7768,14 @@
           <p:nvPr>
             <p:extLst>
               <p:ext uri="{D42A27DB-BD31-4B8C-83A1-F6EECF244321}">
-                <p14:modId xmlns:p14="http://schemas.microsoft.com/office/powerpoint/2010/main" val="594240887"/>
+                <p14:modId xmlns:p14="http://schemas.microsoft.com/office/powerpoint/2010/main" val="4064362151"/>
               </p:ext>
             </p:extLst>
           </p:nvPr>
         </p:nvGraphicFramePr>
         <p:xfrm>
-          <a:off x="691662" y="1245062"/>
-          <a:ext cx="10803652" cy="5557520"/>
+          <a:off x="677333" y="1245062"/>
+          <a:ext cx="10817981" cy="5557520"/>
         </p:xfrm>
         <a:graphic>
           <a:graphicData uri="http://schemas.openxmlformats.org/drawingml/2006/table">
@@ -7780,7 +7784,7 @@
                 <a:tableStyleId>{5C22544A-7EE6-4342-B048-85BDC9FD1C3A}</a:tableStyleId>
               </a:tblPr>
               <a:tblGrid>
-                <a:gridCol w="2383961">
+                <a:gridCol w="2398290">
                   <a:extLst>
                     <a:ext uri="{9D8B030D-6E8A-4147-A177-3AD203B41FA5}">
                       <a16:colId xmlns:a16="http://schemas.microsoft.com/office/drawing/2014/main" val="1303011937"/>
@@ -9646,7 +9650,7 @@
         </p:spPr>
         <p:txBody>
           <a:bodyPr anchor="ctr">
-            <a:normAutofit lnSpcReduction="10000"/>
+            <a:normAutofit/>
           </a:bodyPr>
           <a:lstStyle/>
           <a:p>
@@ -9821,7 +9825,7 @@
                   <a:schemeClr val="tx1"/>
                 </a:solidFill>
               </a:rPr>
-              <a:t> method are </a:t>
+              <a:t> methods are </a:t>
             </a:r>
             <a:r>
               <a:rPr lang="en-US" sz="2000" b="1" i="1" dirty="0">
@@ -9853,39 +9857,7 @@
                   <a:schemeClr val="tx1"/>
                 </a:solidFill>
               </a:rPr>
-              <a:t> method. All </a:t>
-            </a:r>
-            <a:r>
-              <a:rPr lang="en-US" sz="2000" b="1" i="1" dirty="0">
-                <a:solidFill>
-                  <a:schemeClr val="tx1"/>
-                </a:solidFill>
-              </a:rPr>
-              <a:t>safe</a:t>
-            </a:r>
-            <a:r>
-              <a:rPr lang="en-US" sz="2000" dirty="0">
-                <a:solidFill>
-                  <a:schemeClr val="tx1"/>
-                </a:solidFill>
-              </a:rPr>
-              <a:t> methods are </a:t>
-            </a:r>
-            <a:r>
-              <a:rPr lang="en-US" sz="2000" b="1" i="1" dirty="0">
-                <a:solidFill>
-                  <a:schemeClr val="tx1"/>
-                </a:solidFill>
-              </a:rPr>
-              <a:t>idempotent</a:t>
-            </a:r>
-            <a:r>
-              <a:rPr lang="en-US" sz="2000" dirty="0">
-                <a:solidFill>
-                  <a:schemeClr val="tx1"/>
-                </a:solidFill>
-              </a:rPr>
-              <a:t>.</a:t>
+              <a:t> method. </a:t>
             </a:r>
           </a:p>
           <a:p>
@@ -10280,8 +10252,8 @@
         </p:nvSpPr>
         <p:spPr>
           <a:xfrm>
-            <a:off x="2372139" y="0"/>
-            <a:ext cx="7564919" cy="4958206"/>
+            <a:off x="2028637" y="0"/>
+            <a:ext cx="8382947" cy="4958206"/>
           </a:xfrm>
         </p:spPr>
         <p:txBody>
@@ -10311,7 +10283,7 @@
                   <a:schemeClr val="bg1"/>
                 </a:solidFill>
               </a:rPr>
-              <a:t>1. The client establishes a (usually) TCP connection.</a:t>
+              <a:t>1. The client establishes a (most commonly) TCP connection.</a:t>
             </a:r>
             <a:br>
               <a:rPr lang="en-US" sz="3200" i="1" dirty="0">
@@ -10586,7 +10558,7 @@
                   <a:schemeClr val="tx1"/>
                 </a:solidFill>
               </a:rPr>
-              <a:t>The DNS translates domain names (</a:t>
+              <a:t>The DNS translates domain names, like </a:t>
             </a:r>
             <a:r>
               <a:rPr lang="en-US" sz="2000" dirty="0">
@@ -10602,7 +10574,7 @@
                   <a:schemeClr val="tx1"/>
                 </a:solidFill>
               </a:rPr>
-              <a:t>) to numerical IP addresses (255.255.255) for locating and identifying computer services and devices over the web.</a:t>
+              <a:t>, to numerical IP addresses, like 255.255.255, for locating and identifying computer services and devices over the web.</a:t>
             </a:r>
           </a:p>
           <a:p>
@@ -10817,14 +10789,14 @@
           <p:nvPr>
             <p:extLst>
               <p:ext uri="{D42A27DB-BD31-4B8C-83A1-F6EECF244321}">
-                <p14:modId xmlns:p14="http://schemas.microsoft.com/office/powerpoint/2010/main" val="1042711914"/>
+                <p14:modId xmlns:p14="http://schemas.microsoft.com/office/powerpoint/2010/main" val="1409624308"/>
               </p:ext>
             </p:extLst>
           </p:nvPr>
         </p:nvGraphicFramePr>
         <p:xfrm>
           <a:off x="1097280" y="3429000"/>
-          <a:ext cx="10027921" cy="3291840"/>
+          <a:ext cx="10027921" cy="2865120"/>
         </p:xfrm>
         <a:graphic>
           <a:graphicData uri="http://schemas.openxmlformats.org/drawingml/2006/table">
@@ -10840,14 +10812,14 @@
                     </a:ext>
                   </a:extLst>
                 </a:gridCol>
-                <a:gridCol w="6028494">
+                <a:gridCol w="5915786">
                   <a:extLst>
                     <a:ext uri="{9D8B030D-6E8A-4147-A177-3AD203B41FA5}">
                       <a16:colId xmlns:a16="http://schemas.microsoft.com/office/drawing/2014/main" val="2987918954"/>
                     </a:ext>
                   </a:extLst>
                 </a:gridCol>
-                <a:gridCol w="1587883">
+                <a:gridCol w="1700591">
                   <a:extLst>
                     <a:ext uri="{9D8B030D-6E8A-4147-A177-3AD203B41FA5}">
                       <a16:colId xmlns:a16="http://schemas.microsoft.com/office/drawing/2014/main" val="2884329996"/>
@@ -11027,7 +10999,7 @@
                       </a:r>
                       <a:r>
                         <a:rPr lang="en-US" sz="1400" dirty="0" err="1"/>
-                        <a:t>recursor</a:t>
+                        <a:t>Recursor</a:t>
                       </a:r>
                       <a:endParaRPr lang="en-US" sz="1400" dirty="0"/>
                     </a:p>
@@ -11424,7 +11396,7 @@
                           <a:ea typeface="+mn-ea"/>
                           <a:cs typeface="+mn-cs"/>
                         </a:rPr>
-                        <a:t>server hosts the last portion of a hostname. For example,  in Revature.com, the TLD server is “com”).</a:t>
+                        <a:t>server hosts the last portion of a hostname. For example,  in Revature.com, the TLD server is “com”.</a:t>
                       </a:r>
                       <a:endParaRPr lang="en-US" sz="1400" dirty="0"/>
                     </a:p>
@@ -11925,7 +11897,13 @@
           <a:p>
             <a:r>
               <a:rPr lang="en-US" sz="1900" dirty="0"/>
-              <a:t>The client requests a resource using its URL. The server uses this URL to choose one of the variants (representations) it provides to return. The overall resource and each representation have a specific URL. How a specific representation is chosen when the resource is called is determined by </a:t>
+              <a:t>The client requests a resource using its URL. The server uses this URL to choose one of the variants (representations) it provides to return. </a:t>
+            </a:r>
+          </a:p>
+          <a:p>
+            <a:r>
+              <a:rPr lang="en-US" sz="1900" dirty="0"/>
+              <a:t>The overall resource and each representation have a specific URL. How a specific representation is chosen when the resource is called is determined by </a:t>
             </a:r>
             <a:r>
               <a:rPr lang="en-US" sz="1900" b="1" i="1" dirty="0"/>
@@ -13174,7 +13152,7 @@
                   <a:schemeClr val="tx1"/>
                 </a:solidFill>
               </a:rPr>
-              <a:t>. </a:t>
+              <a:t>.</a:t>
             </a:r>
           </a:p>
           <a:p>
@@ -13204,7 +13182,7 @@
               <a:t>ping the server periodically via the </a:t>
             </a:r>
             <a:r>
-              <a:rPr lang="en-US" sz="2000" dirty="0" err="1">
+              <a:rPr lang="en-US" sz="2000" b="1" i="1" dirty="0" err="1">
                 <a:solidFill>
                   <a:schemeClr val="tx1"/>
                 </a:solidFill>
@@ -13217,7 +13195,7 @@
                   <a:schemeClr val="tx1"/>
                 </a:solidFill>
               </a:rPr>
-              <a:t>, </a:t>
+              <a:t> object, </a:t>
             </a:r>
           </a:p>
           <a:p>

</xml_diff>